<commit_message>
added updated use case diagrams
</commit_message>
<xml_diff>
--- a/Interim Presentation/Software Engineering (1).pptx
+++ b/Interim Presentation/Software Engineering (1).pptx
@@ -6,7 +6,7 @@
     <p:sldMasterId id="2147483674" r:id="rId3"/>
   </p:sldMasterIdLst>
   <p:notesMasterIdLst>
-    <p:notesMasterId r:id="rId24"/>
+    <p:notesMasterId r:id="rId25"/>
   </p:notesMasterIdLst>
   <p:sldIdLst>
     <p:sldId id="257" r:id="rId4"/>
@@ -25,10 +25,11 @@
     <p:sldId id="277" r:id="rId17"/>
     <p:sldId id="276" r:id="rId18"/>
     <p:sldId id="275" r:id="rId19"/>
-    <p:sldId id="279" r:id="rId20"/>
-    <p:sldId id="280" r:id="rId21"/>
-    <p:sldId id="278" r:id="rId22"/>
-    <p:sldId id="281" r:id="rId23"/>
+    <p:sldId id="286" r:id="rId20"/>
+    <p:sldId id="279" r:id="rId21"/>
+    <p:sldId id="280" r:id="rId22"/>
+    <p:sldId id="278" r:id="rId23"/>
+    <p:sldId id="281" r:id="rId24"/>
   </p:sldIdLst>
   <p:sldSz cx="9144000" cy="6858000" type="screen4x3"/>
   <p:notesSz cx="6858000" cy="9144000"/>
@@ -129,7 +130,7 @@
   </p:defaultTextStyle>
   <p:extLst>
     <p:ext uri="{EFAFB233-063F-42B5-8137-9DF3F51BA10A}">
-      <p15:sldGuideLst xmlns:p15="http://schemas.microsoft.com/office/powerpoint/2012/main" xmlns="">
+      <p15:sldGuideLst xmlns:p15="http://schemas.microsoft.com/office/powerpoint/2012/main">
         <p15:guide id="1" orient="horz" pos="2160">
           <p15:clr>
             <a:srgbClr val="A4A3A4"/>
@@ -584,7 +585,7 @@
             <a:fld id="{81331B57-0BE5-4F82-AA58-76F53EFF3ADA}" type="datetime8">
               <a:rPr lang="en-US" smtClean="0"/>
               <a:pPr/>
-              <a:t>3/1/2017 12:29 PM</a:t>
+              <a:t>3/1/2017 6:28 PM</a:t>
             </a:fld>
             <a:endParaRPr lang="en-US" dirty="0"/>
           </a:p>
@@ -773,7 +774,7 @@
             <a:fld id="{81331B57-0BE5-4F82-AA58-76F53EFF3ADA}" type="datetime8">
               <a:rPr lang="en-US" smtClean="0"/>
               <a:pPr/>
-              <a:t>3/1/2017 12:30 PM</a:t>
+              <a:t>3/1/2017 6:28 PM</a:t>
             </a:fld>
             <a:endParaRPr lang="en-US"/>
           </a:p>
@@ -957,7 +958,7 @@
             <a:fld id="{81331B57-0BE5-4F82-AA58-76F53EFF3ADA}" type="datetime8">
               <a:rPr lang="en-US" smtClean="0"/>
               <a:pPr/>
-              <a:t>3/1/2017 12:30 PM</a:t>
+              <a:t>3/1/2017 6:28 PM</a:t>
             </a:fld>
             <a:endParaRPr lang="en-US"/>
           </a:p>
@@ -1141,7 +1142,7 @@
             <a:fld id="{81331B57-0BE5-4F82-AA58-76F53EFF3ADA}" type="datetime8">
               <a:rPr lang="en-US" smtClean="0"/>
               <a:pPr/>
-              <a:t>3/1/2017 12:30 PM</a:t>
+              <a:t>3/1/2017 6:28 PM</a:t>
             </a:fld>
             <a:endParaRPr lang="en-US"/>
           </a:p>
@@ -1325,7 +1326,7 @@
             <a:fld id="{81331B57-0BE5-4F82-AA58-76F53EFF3ADA}" type="datetime8">
               <a:rPr lang="en-US" smtClean="0"/>
               <a:pPr/>
-              <a:t>3/1/2017 12:30 PM</a:t>
+              <a:t>3/1/2017 6:28 PM</a:t>
             </a:fld>
             <a:endParaRPr lang="en-US"/>
           </a:p>
@@ -1509,7 +1510,7 @@
             <a:fld id="{81331B57-0BE5-4F82-AA58-76F53EFF3ADA}" type="datetime8">
               <a:rPr lang="en-US" smtClean="0"/>
               <a:pPr/>
-              <a:t>3/1/2017 12:30 PM</a:t>
+              <a:t>3/1/2017 6:28 PM</a:t>
             </a:fld>
             <a:endParaRPr lang="en-US"/>
           </a:p>
@@ -1693,7 +1694,7 @@
             <a:fld id="{81331B57-0BE5-4F82-AA58-76F53EFF3ADA}" type="datetime8">
               <a:rPr lang="en-US" smtClean="0"/>
               <a:pPr/>
-              <a:t>3/1/2017 12:30 PM</a:t>
+              <a:t>3/1/2017 6:28 PM</a:t>
             </a:fld>
             <a:endParaRPr lang="en-US"/>
           </a:p>
@@ -1877,7 +1878,7 @@
             <a:fld id="{81331B57-0BE5-4F82-AA58-76F53EFF3ADA}" type="datetime8">
               <a:rPr lang="en-US" smtClean="0"/>
               <a:pPr/>
-              <a:t>3/1/2017 12:30 PM</a:t>
+              <a:t>3/1/2017 6:28 PM</a:t>
             </a:fld>
             <a:endParaRPr lang="en-US"/>
           </a:p>
@@ -2061,7 +2062,7 @@
             <a:fld id="{81331B57-0BE5-4F82-AA58-76F53EFF3ADA}" type="datetime8">
               <a:rPr lang="en-US" smtClean="0"/>
               <a:pPr/>
-              <a:t>3/1/2017 12:30 PM</a:t>
+              <a:t>3/1/2017 6:42 PM</a:t>
             </a:fld>
             <a:endParaRPr lang="en-US"/>
           </a:p>
@@ -2148,7 +2149,7 @@
     </p:spTree>
     <p:extLst>
       <p:ext uri="{BB962C8B-B14F-4D97-AF65-F5344CB8AC3E}">
-        <p14:creationId xmlns:p14="http://schemas.microsoft.com/office/powerpoint/2010/main" val="265286335"/>
+        <p14:creationId xmlns:p14="http://schemas.microsoft.com/office/powerpoint/2010/main" val="784669838"/>
       </p:ext>
     </p:extLst>
   </p:cSld>
@@ -2245,7 +2246,7 @@
             <a:fld id="{81331B57-0BE5-4F82-AA58-76F53EFF3ADA}" type="datetime8">
               <a:rPr lang="en-US" smtClean="0"/>
               <a:pPr/>
-              <a:t>3/1/2017 12:30 PM</a:t>
+              <a:t>3/1/2017 6:28 PM</a:t>
             </a:fld>
             <a:endParaRPr lang="en-US"/>
           </a:p>
@@ -2332,7 +2333,7 @@
     </p:spTree>
     <p:extLst>
       <p:ext uri="{BB962C8B-B14F-4D97-AF65-F5344CB8AC3E}">
-        <p14:creationId xmlns:p14="http://schemas.microsoft.com/office/powerpoint/2010/main" val="3658029145"/>
+        <p14:creationId xmlns:p14="http://schemas.microsoft.com/office/powerpoint/2010/main" val="265286335"/>
       </p:ext>
     </p:extLst>
   </p:cSld>
@@ -2429,7 +2430,7 @@
             <a:fld id="{81331B57-0BE5-4F82-AA58-76F53EFF3ADA}" type="datetime8">
               <a:rPr lang="en-US" smtClean="0"/>
               <a:pPr/>
-              <a:t>3/1/2017 12:30 PM</a:t>
+              <a:t>3/1/2017 6:28 PM</a:t>
             </a:fld>
             <a:endParaRPr lang="en-US"/>
           </a:p>
@@ -2516,7 +2517,7 @@
     </p:spTree>
     <p:extLst>
       <p:ext uri="{BB962C8B-B14F-4D97-AF65-F5344CB8AC3E}">
-        <p14:creationId xmlns:p14="http://schemas.microsoft.com/office/powerpoint/2010/main" val="671318385"/>
+        <p14:creationId xmlns:p14="http://schemas.microsoft.com/office/powerpoint/2010/main" val="3658029145"/>
       </p:ext>
     </p:extLst>
   </p:cSld>
@@ -2613,7 +2614,7 @@
             <a:fld id="{81331B57-0BE5-4F82-AA58-76F53EFF3ADA}" type="datetime8">
               <a:rPr lang="en-US" smtClean="0"/>
               <a:pPr/>
-              <a:t>3/1/2017 12:30 PM</a:t>
+              <a:t>3/1/2017 6:28 PM</a:t>
             </a:fld>
             <a:endParaRPr lang="en-US" dirty="0"/>
           </a:p>
@@ -2807,7 +2808,7 @@
             <a:fld id="{81331B57-0BE5-4F82-AA58-76F53EFF3ADA}" type="datetime8">
               <a:rPr lang="en-US" smtClean="0"/>
               <a:pPr/>
-              <a:t>3/1/2017 2:08 PM</a:t>
+              <a:t>3/1/2017 6:28 PM</a:t>
             </a:fld>
             <a:endParaRPr lang="en-US"/>
           </a:p>
@@ -2886,6 +2887,190 @@
               <a:rPr lang="en-US" smtClean="0"/>
               <a:pPr/>
               <a:t>20</a:t>
+            </a:fld>
+            <a:endParaRPr lang="en-US" dirty="0"/>
+          </a:p>
+        </p:txBody>
+      </p:sp>
+    </p:spTree>
+    <p:extLst>
+      <p:ext uri="{BB962C8B-B14F-4D97-AF65-F5344CB8AC3E}">
+        <p14:creationId xmlns:p14="http://schemas.microsoft.com/office/powerpoint/2010/main" val="671318385"/>
+      </p:ext>
+    </p:extLst>
+  </p:cSld>
+  <p:clrMapOvr>
+    <a:masterClrMapping/>
+  </p:clrMapOvr>
+</p:notes>
+</file>
+
+<file path=ppt/notesSlides/notesSlide21.xml><?xml version="1.0" encoding="utf-8"?>
+<p:notes xmlns:a="http://schemas.openxmlformats.org/drawingml/2006/main" xmlns:r="http://schemas.openxmlformats.org/officeDocument/2006/relationships" xmlns:p="http://schemas.openxmlformats.org/presentationml/2006/main">
+  <p:cSld>
+    <p:spTree>
+      <p:nvGrpSpPr>
+        <p:cNvPr id="1" name=""/>
+        <p:cNvGrpSpPr/>
+        <p:nvPr/>
+      </p:nvGrpSpPr>
+      <p:grpSpPr>
+        <a:xfrm>
+          <a:off x="0" y="0"/>
+          <a:ext cx="0" cy="0"/>
+          <a:chOff x="0" y="0"/>
+          <a:chExt cx="0" cy="0"/>
+        </a:xfrm>
+      </p:grpSpPr>
+      <p:sp>
+        <p:nvSpPr>
+          <p:cNvPr id="2" name="Slide Image Placeholder 1"/>
+          <p:cNvSpPr>
+            <a:spLocks noGrp="1" noRot="1" noChangeAspect="1"/>
+          </p:cNvSpPr>
+          <p:nvPr>
+            <p:ph type="sldImg"/>
+          </p:nvPr>
+        </p:nvSpPr>
+        <p:spPr/>
+      </p:sp>
+      <p:sp>
+        <p:nvSpPr>
+          <p:cNvPr id="3" name="Notes Placeholder 2"/>
+          <p:cNvSpPr>
+            <a:spLocks noGrp="1"/>
+          </p:cNvSpPr>
+          <p:nvPr>
+            <p:ph type="body" idx="1"/>
+          </p:nvPr>
+        </p:nvSpPr>
+        <p:spPr/>
+        <p:txBody>
+          <a:bodyPr>
+            <a:normAutofit/>
+          </a:bodyPr>
+          <a:lstStyle/>
+          <a:p>
+            <a:endParaRPr lang="en-US"/>
+          </a:p>
+        </p:txBody>
+      </p:sp>
+      <p:sp>
+        <p:nvSpPr>
+          <p:cNvPr id="4" name="Header Placeholder 3"/>
+          <p:cNvSpPr>
+            <a:spLocks noGrp="1"/>
+          </p:cNvSpPr>
+          <p:nvPr>
+            <p:ph type="hdr" sz="quarter" idx="10"/>
+          </p:nvPr>
+        </p:nvSpPr>
+        <p:spPr/>
+        <p:txBody>
+          <a:bodyPr/>
+          <a:lstStyle/>
+          <a:p>
+            <a:endParaRPr lang="en-US" dirty="0"/>
+          </a:p>
+        </p:txBody>
+      </p:sp>
+      <p:sp>
+        <p:nvSpPr>
+          <p:cNvPr id="5" name="Date Placeholder 4"/>
+          <p:cNvSpPr>
+            <a:spLocks noGrp="1"/>
+          </p:cNvSpPr>
+          <p:nvPr>
+            <p:ph type="dt" idx="11"/>
+          </p:nvPr>
+        </p:nvSpPr>
+        <p:spPr/>
+        <p:txBody>
+          <a:bodyPr/>
+          <a:lstStyle/>
+          <a:p>
+            <a:fld id="{81331B57-0BE5-4F82-AA58-76F53EFF3ADA}" type="datetime8">
+              <a:rPr lang="en-US" smtClean="0"/>
+              <a:pPr/>
+              <a:t>3/1/2017 6:28 PM</a:t>
+            </a:fld>
+            <a:endParaRPr lang="en-US"/>
+          </a:p>
+        </p:txBody>
+      </p:sp>
+      <p:sp>
+        <p:nvSpPr>
+          <p:cNvPr id="6" name="Footer Placeholder 5"/>
+          <p:cNvSpPr>
+            <a:spLocks noGrp="1"/>
+          </p:cNvSpPr>
+          <p:nvPr>
+            <p:ph type="ftr" sz="quarter" idx="12"/>
+          </p:nvPr>
+        </p:nvSpPr>
+        <p:spPr/>
+        <p:txBody>
+          <a:bodyPr/>
+          <a:lstStyle/>
+          <a:p>
+            <a:r>
+              <a:rPr lang="en-US">
+                <a:solidFill>
+                  <a:srgbClr val="000000"/>
+                </a:solidFill>
+              </a:rPr>
+              <a:t>© 2007 Microsoft Corporation. All rights reserved. Microsoft, Windows, Windows Vista and other product names are or may be registered trademarks and/or trademarks in the U.S. and/or other countries.</a:t>
+            </a:r>
+          </a:p>
+          <a:p>
+            <a:r>
+              <a:rPr lang="en-US">
+                <a:solidFill>
+                  <a:srgbClr val="000000"/>
+                </a:solidFill>
+              </a:rPr>
+              <a:t>The information herein is for informational purposes only and represents the current view of Microsoft Corporation as of the date of this presentation.  Because Microsoft must respond to changing market conditions, it should not be interpreted to be a commitment on the part of Microsoft, and Microsoft cannot guarantee the accuracy of any information provided after the date of this presentation.  </a:t>
+            </a:r>
+            <a:br>
+              <a:rPr lang="en-US">
+                <a:solidFill>
+                  <a:srgbClr val="000000"/>
+                </a:solidFill>
+              </a:rPr>
+            </a:br>
+            <a:r>
+              <a:rPr lang="en-US">
+                <a:solidFill>
+                  <a:srgbClr val="000000"/>
+                </a:solidFill>
+              </a:rPr>
+              <a:t>MICROSOFT MAKES NO WARRANTIES, EXPRESS, IMPLIED OR STATUTORY, AS TO THE INFORMATION IN THIS PRESENTATION.</a:t>
+            </a:r>
+          </a:p>
+          <a:p>
+            <a:endParaRPr lang="en-US" dirty="0"/>
+          </a:p>
+        </p:txBody>
+      </p:sp>
+      <p:sp>
+        <p:nvSpPr>
+          <p:cNvPr id="7" name="Slide Number Placeholder 6"/>
+          <p:cNvSpPr>
+            <a:spLocks noGrp="1"/>
+          </p:cNvSpPr>
+          <p:nvPr>
+            <p:ph type="sldNum" sz="quarter" idx="13"/>
+          </p:nvPr>
+        </p:nvSpPr>
+        <p:spPr/>
+        <p:txBody>
+          <a:bodyPr/>
+          <a:lstStyle/>
+          <a:p>
+            <a:fld id="{EC87E0CF-87F6-4B58-B8B8-DCAB2DAAF3CA}" type="slidenum">
+              <a:rPr lang="en-US" smtClean="0"/>
+              <a:pPr/>
+              <a:t>21</a:t>
             </a:fld>
             <a:endParaRPr lang="en-US" dirty="0"/>
           </a:p>
@@ -2991,7 +3176,7 @@
             <a:fld id="{81331B57-0BE5-4F82-AA58-76F53EFF3ADA}" type="datetime8">
               <a:rPr lang="en-US" smtClean="0"/>
               <a:pPr/>
-              <a:t>3/1/2017 12:30 PM</a:t>
+              <a:t>3/1/2017 6:28 PM</a:t>
             </a:fld>
             <a:endParaRPr lang="en-US"/>
           </a:p>
@@ -3170,7 +3355,7 @@
             <a:fld id="{81331B57-0BE5-4F82-AA58-76F53EFF3ADA}" type="datetime8">
               <a:rPr lang="en-US" smtClean="0"/>
               <a:pPr/>
-              <a:t>3/1/2017 12:30 PM</a:t>
+              <a:t>3/1/2017 6:28 PM</a:t>
             </a:fld>
             <a:endParaRPr lang="en-US"/>
           </a:p>
@@ -3349,7 +3534,7 @@
             <a:fld id="{81331B57-0BE5-4F82-AA58-76F53EFF3ADA}" type="datetime8">
               <a:rPr lang="en-US" smtClean="0"/>
               <a:pPr/>
-              <a:t>3/1/2017 12:30 PM</a:t>
+              <a:t>3/1/2017 6:28 PM</a:t>
             </a:fld>
             <a:endParaRPr lang="en-US"/>
           </a:p>
@@ -3533,7 +3718,7 @@
             <a:fld id="{81331B57-0BE5-4F82-AA58-76F53EFF3ADA}" type="datetime8">
               <a:rPr lang="en-US" smtClean="0"/>
               <a:pPr/>
-              <a:t>3/1/2017 2:28 PM</a:t>
+              <a:t>3/1/2017 6:28 PM</a:t>
             </a:fld>
             <a:endParaRPr lang="en-US"/>
           </a:p>
@@ -3717,7 +3902,7 @@
             <a:fld id="{81331B57-0BE5-4F82-AA58-76F53EFF3ADA}" type="datetime8">
               <a:rPr lang="en-US" smtClean="0"/>
               <a:pPr/>
-              <a:t>3/1/2017 2:28 PM</a:t>
+              <a:t>3/1/2017 6:28 PM</a:t>
             </a:fld>
             <a:endParaRPr lang="en-US"/>
           </a:p>
@@ -3901,7 +4086,7 @@
             <a:fld id="{81331B57-0BE5-4F82-AA58-76F53EFF3ADA}" type="datetime8">
               <a:rPr lang="en-US" smtClean="0"/>
               <a:pPr/>
-              <a:t>3/1/2017 2:28 PM</a:t>
+              <a:t>3/1/2017 6:28 PM</a:t>
             </a:fld>
             <a:endParaRPr lang="en-US"/>
           </a:p>
@@ -4085,7 +4270,7 @@
             <a:fld id="{81331B57-0BE5-4F82-AA58-76F53EFF3ADA}" type="datetime8">
               <a:rPr lang="en-US" smtClean="0"/>
               <a:pPr/>
-              <a:t>3/1/2017 12:30 PM</a:t>
+              <a:t>3/1/2017 6:28 PM</a:t>
             </a:fld>
             <a:endParaRPr lang="en-US"/>
           </a:p>
@@ -7713,14 +7898,11 @@
           <a:p>
             <a:pPr lvl="1"/>
             <a:r>
-              <a:rPr lang="en-US" dirty="0" smtClean="0">
+              <a:rPr lang="en-US" dirty="0">
                 <a:latin typeface="Georgia" panose="02040502050405020303" pitchFamily="18" charset="0"/>
               </a:rPr>
               <a:t>Cross-platform application</a:t>
             </a:r>
-            <a:endParaRPr lang="en-US" dirty="0">
-              <a:latin typeface="Georgia" panose="02040502050405020303" pitchFamily="18" charset="0"/>
-            </a:endParaRPr>
           </a:p>
           <a:p>
             <a:pPr lvl="1"/>
@@ -8411,7 +8593,7 @@
       </p:sp>
       <p:pic>
         <p:nvPicPr>
-          <p:cNvPr id="6" name="Picture 5"/>
+          <p:cNvPr id="16" name="Picture 15"/>
           <p:cNvPicPr>
             <a:picLocks noChangeAspect="1"/>
           </p:cNvPicPr>
@@ -8431,8 +8613,38 @@
         </p:blipFill>
         <p:spPr>
           <a:xfrm>
-            <a:off x="2123695" y="1066800"/>
-            <a:ext cx="6791705" cy="4933463"/>
+            <a:off x="3048000" y="304800"/>
+            <a:ext cx="4617197" cy="3190648"/>
+          </a:xfrm>
+          <a:prstGeom prst="rect">
+            <a:avLst/>
+          </a:prstGeom>
+        </p:spPr>
+      </p:pic>
+      <p:pic>
+        <p:nvPicPr>
+          <p:cNvPr id="18" name="Picture 17"/>
+          <p:cNvPicPr>
+            <a:picLocks noChangeAspect="1"/>
+          </p:cNvPicPr>
+          <p:nvPr/>
+        </p:nvPicPr>
+        <p:blipFill>
+          <a:blip r:embed="rId4">
+            <a:extLst>
+              <a:ext uri="{28A0092B-C50C-407E-A947-70E740481C1C}">
+                <a14:useLocalDpi xmlns:a14="http://schemas.microsoft.com/office/drawing/2010/main" val="0"/>
+              </a:ext>
+            </a:extLst>
+          </a:blip>
+          <a:stretch>
+            <a:fillRect/>
+          </a:stretch>
+        </p:blipFill>
+        <p:spPr>
+          <a:xfrm>
+            <a:off x="3048000" y="3570060"/>
+            <a:ext cx="4432929" cy="2355273"/>
           </a:xfrm>
           <a:prstGeom prst="rect">
             <a:avLst/>
@@ -8498,7 +8710,7 @@
               <a:rPr lang="en-US" dirty="0">
                 <a:latin typeface="Georgia" panose="02040502050405020303" pitchFamily="18" charset="0"/>
               </a:rPr>
-              <a:t>Development Tools</a:t>
+              <a:t>Diagrams</a:t>
             </a:r>
             <a:br>
               <a:rPr lang="en-US" dirty="0">
@@ -8512,7 +8724,7 @@
                 </a:solidFill>
                 <a:latin typeface="Georgia" panose="02040502050405020303" pitchFamily="18" charset="0"/>
               </a:rPr>
-              <a:t>Visual Paradigm</a:t>
+              <a:t>Use Case</a:t>
             </a:r>
             <a:endParaRPr lang="en-US" dirty="0">
               <a:solidFill>
@@ -8523,87 +8735,40 @@
           </a:p>
         </p:txBody>
       </p:sp>
-      <p:sp>
-        <p:nvSpPr>
-          <p:cNvPr id="3" name="Text Placeholder 2"/>
-          <p:cNvSpPr>
-            <a:spLocks noGrp="1"/>
-          </p:cNvSpPr>
-          <p:nvPr>
-            <p:ph type="body" sz="quarter" idx="10"/>
-          </p:nvPr>
-        </p:nvSpPr>
+      <p:pic>
+        <p:nvPicPr>
+          <p:cNvPr id="6" name="Picture 5"/>
+          <p:cNvPicPr>
+            <a:picLocks noChangeAspect="1"/>
+          </p:cNvPicPr>
+          <p:nvPr/>
+        </p:nvPicPr>
+        <p:blipFill>
+          <a:blip r:embed="rId3">
+            <a:extLst>
+              <a:ext uri="{28A0092B-C50C-407E-A947-70E740481C1C}">
+                <a14:useLocalDpi xmlns:a14="http://schemas.microsoft.com/office/drawing/2010/main" val="0"/>
+              </a:ext>
+            </a:extLst>
+          </a:blip>
+          <a:stretch>
+            <a:fillRect/>
+          </a:stretch>
+        </p:blipFill>
         <p:spPr>
           <a:xfrm>
-            <a:off x="381000" y="1905000"/>
-            <a:ext cx="8382000" cy="4038600"/>
+            <a:off x="1447800" y="1393583"/>
+            <a:ext cx="6477000" cy="4583281"/>
           </a:xfrm>
+          <a:prstGeom prst="rect">
+            <a:avLst/>
+          </a:prstGeom>
         </p:spPr>
-        <p:txBody>
-          <a:bodyPr>
-            <a:normAutofit/>
-          </a:bodyPr>
-          <a:lstStyle/>
-          <a:p>
-            <a:r>
-              <a:rPr lang="en-US" dirty="0" smtClean="0">
-                <a:latin typeface="Georgia" panose="02040502050405020303" pitchFamily="18" charset="0"/>
-              </a:rPr>
-              <a:t>What is Visual Paradigm?</a:t>
-            </a:r>
-            <a:endParaRPr lang="en-US" dirty="0">
-              <a:latin typeface="Georgia" panose="02040502050405020303" pitchFamily="18" charset="0"/>
-            </a:endParaRPr>
-          </a:p>
-          <a:p>
-            <a:pPr lvl="1"/>
-            <a:r>
-              <a:rPr lang="en-US" dirty="0" smtClean="0">
-                <a:latin typeface="Georgia" panose="02040502050405020303" pitchFamily="18" charset="0"/>
-              </a:rPr>
-              <a:t>System modeling software</a:t>
-            </a:r>
-            <a:endParaRPr lang="en-US" dirty="0">
-              <a:latin typeface="Georgia" panose="02040502050405020303" pitchFamily="18" charset="0"/>
-            </a:endParaRPr>
-          </a:p>
-          <a:p>
-            <a:pPr marL="517525" lvl="1" indent="0">
-              <a:buNone/>
-            </a:pPr>
-            <a:endParaRPr lang="en-US" dirty="0">
-              <a:latin typeface="Georgia" panose="02040502050405020303" pitchFamily="18" charset="0"/>
-            </a:endParaRPr>
-          </a:p>
-          <a:p>
-            <a:r>
-              <a:rPr lang="en-US" dirty="0" smtClean="0">
-                <a:latin typeface="Georgia" panose="02040502050405020303" pitchFamily="18" charset="0"/>
-              </a:rPr>
-              <a:t>What </a:t>
-            </a:r>
-            <a:r>
-              <a:rPr lang="en-US" dirty="0">
-                <a:latin typeface="Georgia" panose="02040502050405020303" pitchFamily="18" charset="0"/>
-              </a:rPr>
-              <a:t>we used it for</a:t>
-            </a:r>
-          </a:p>
-          <a:p>
-            <a:pPr lvl="1"/>
-            <a:r>
-              <a:rPr lang="en-US" dirty="0" smtClean="0">
-                <a:latin typeface="Georgia" panose="02040502050405020303" pitchFamily="18" charset="0"/>
-              </a:rPr>
-              <a:t>Create diagrams</a:t>
-            </a:r>
-          </a:p>
-        </p:txBody>
-      </p:sp>
+      </p:pic>
     </p:spTree>
     <p:extLst>
       <p:ext uri="{BB962C8B-B14F-4D97-AF65-F5344CB8AC3E}">
-        <p14:creationId xmlns:p14="http://schemas.microsoft.com/office/powerpoint/2010/main" val="3698677319"/>
+        <p14:creationId xmlns:p14="http://schemas.microsoft.com/office/powerpoint/2010/main" val="1600644249"/>
       </p:ext>
     </p:extLst>
   </p:cSld>
@@ -8673,7 +8838,7 @@
                 </a:solidFill>
                 <a:latin typeface="Georgia" panose="02040502050405020303" pitchFamily="18" charset="0"/>
               </a:rPr>
-              <a:t>XAMPP</a:t>
+              <a:t>Visual Paradigm</a:t>
             </a:r>
             <a:endParaRPr lang="en-US" dirty="0">
               <a:solidFill>
@@ -8707,46 +8872,19 @@
           <a:lstStyle/>
           <a:p>
             <a:r>
-              <a:rPr lang="en-US" dirty="0" smtClean="0">
-                <a:latin typeface="Georgia" panose="02040502050405020303" pitchFamily="18" charset="0"/>
-              </a:rPr>
-              <a:t>What </a:t>
-            </a:r>
-            <a:r>
               <a:rPr lang="en-US" dirty="0">
                 <a:latin typeface="Georgia" panose="02040502050405020303" pitchFamily="18" charset="0"/>
               </a:rPr>
-              <a:t>is </a:t>
-            </a:r>
-            <a:r>
-              <a:rPr lang="en-US" dirty="0" smtClean="0">
-                <a:latin typeface="Georgia" panose="02040502050405020303" pitchFamily="18" charset="0"/>
-              </a:rPr>
-              <a:t>it XAMPP?</a:t>
-            </a:r>
-            <a:endParaRPr lang="en-US" dirty="0">
-              <a:latin typeface="Georgia" panose="02040502050405020303" pitchFamily="18" charset="0"/>
-            </a:endParaRPr>
+              <a:t>What is Visual Paradigm?</a:t>
+            </a:r>
           </a:p>
           <a:p>
             <a:pPr lvl="1"/>
-            <a:r>
-              <a:rPr lang="en-US" dirty="0" smtClean="0">
-                <a:latin typeface="Georgia" panose="02040502050405020303" pitchFamily="18" charset="0"/>
-              </a:rPr>
-              <a:t>Local </a:t>
-            </a:r>
             <a:r>
               <a:rPr lang="en-US" dirty="0">
                 <a:latin typeface="Georgia" panose="02040502050405020303" pitchFamily="18" charset="0"/>
               </a:rPr>
-              <a:t>w</a:t>
-            </a:r>
-            <a:r>
-              <a:rPr lang="en-US" dirty="0" smtClean="0">
-                <a:latin typeface="Georgia" panose="02040502050405020303" pitchFamily="18" charset="0"/>
-              </a:rPr>
-              <a:t>eb hosting tool</a:t>
+              <a:t>System modeling software</a:t>
             </a:r>
           </a:p>
           <a:p>
@@ -8759,12 +8897,6 @@
           </a:p>
           <a:p>
             <a:r>
-              <a:rPr lang="en-US" dirty="0" smtClean="0">
-                <a:latin typeface="Georgia" panose="02040502050405020303" pitchFamily="18" charset="0"/>
-              </a:rPr>
-              <a:t>*</a:t>
-            </a:r>
-            <a:r>
               <a:rPr lang="en-US" dirty="0">
                 <a:latin typeface="Georgia" panose="02040502050405020303" pitchFamily="18" charset="0"/>
               </a:rPr>
@@ -8774,21 +8906,18 @@
           <a:p>
             <a:pPr lvl="1"/>
             <a:r>
-              <a:rPr lang="en-US" dirty="0" smtClean="0">
+              <a:rPr lang="en-US" dirty="0">
                 <a:latin typeface="Georgia" panose="02040502050405020303" pitchFamily="18" charset="0"/>
               </a:rPr>
-              <a:t>Create local server</a:t>
-            </a:r>
-            <a:endParaRPr lang="en-US" dirty="0">
-              <a:latin typeface="Georgia" panose="02040502050405020303" pitchFamily="18" charset="0"/>
-            </a:endParaRPr>
+              <a:t>Create diagrams</a:t>
+            </a:r>
           </a:p>
         </p:txBody>
       </p:sp>
     </p:spTree>
     <p:extLst>
       <p:ext uri="{BB962C8B-B14F-4D97-AF65-F5344CB8AC3E}">
-        <p14:creationId xmlns:p14="http://schemas.microsoft.com/office/powerpoint/2010/main" val="1724907069"/>
+        <p14:creationId xmlns:p14="http://schemas.microsoft.com/office/powerpoint/2010/main" val="3698677319"/>
       </p:ext>
     </p:extLst>
   </p:cSld>
@@ -8858,7 +8987,7 @@
                 </a:solidFill>
                 <a:latin typeface="Georgia" panose="02040502050405020303" pitchFamily="18" charset="0"/>
               </a:rPr>
-              <a:t>Notepad++</a:t>
+              <a:t>XAMPP</a:t>
             </a:r>
             <a:endParaRPr lang="en-US" dirty="0">
               <a:solidFill>
@@ -8892,95 +9021,52 @@
           <a:lstStyle/>
           <a:p>
             <a:r>
-              <a:rPr lang="en-US" dirty="0" smtClean="0">
-                <a:latin typeface="Georgia" panose="02040502050405020303" pitchFamily="18" charset="0"/>
-              </a:rPr>
-              <a:t>What </a:t>
-            </a:r>
-            <a:r>
               <a:rPr lang="en-US" dirty="0">
                 <a:latin typeface="Georgia" panose="02040502050405020303" pitchFamily="18" charset="0"/>
               </a:rPr>
-              <a:t>is </a:t>
-            </a:r>
-            <a:r>
-              <a:rPr lang="en-US" dirty="0" smtClean="0">
+              <a:t>What is it XAMPP?</a:t>
+            </a:r>
+          </a:p>
+          <a:p>
+            <a:pPr lvl="1"/>
+            <a:r>
+              <a:rPr lang="en-US" dirty="0">
                 <a:latin typeface="Georgia" panose="02040502050405020303" pitchFamily="18" charset="0"/>
               </a:rPr>
-              <a:t>Notepad++?</a:t>
-            </a:r>
+              <a:t>Local web hosting tool</a:t>
+            </a:r>
+          </a:p>
+          <a:p>
+            <a:pPr marL="517525" lvl="1" indent="0">
+              <a:buNone/>
+            </a:pPr>
             <a:endParaRPr lang="en-US" dirty="0">
               <a:latin typeface="Georgia" panose="02040502050405020303" pitchFamily="18" charset="0"/>
             </a:endParaRPr>
           </a:p>
           <a:p>
-            <a:pPr lvl="1"/>
-            <a:r>
-              <a:rPr lang="en-US" dirty="0" smtClean="0">
-                <a:latin typeface="Georgia" panose="02040502050405020303" pitchFamily="18" charset="0"/>
-              </a:rPr>
-              <a:t>A text editor</a:t>
-            </a:r>
-            <a:endParaRPr lang="en-US" dirty="0">
-              <a:latin typeface="Georgia" panose="02040502050405020303" pitchFamily="18" charset="0"/>
-            </a:endParaRPr>
-          </a:p>
-          <a:p>
-            <a:pPr lvl="1"/>
-            <a:r>
-              <a:rPr lang="en-US" dirty="0" smtClean="0">
-                <a:latin typeface="Georgia" panose="02040502050405020303" pitchFamily="18" charset="0"/>
-              </a:rPr>
-              <a:t>Extensive plugin library</a:t>
-            </a:r>
-            <a:endParaRPr lang="en-US" dirty="0">
-              <a:latin typeface="Georgia" panose="02040502050405020303" pitchFamily="18" charset="0"/>
-            </a:endParaRPr>
-          </a:p>
-          <a:p>
-            <a:pPr lvl="1"/>
-            <a:endParaRPr lang="en-US" dirty="0">
-              <a:latin typeface="Georgia" panose="02040502050405020303" pitchFamily="18" charset="0"/>
-            </a:endParaRPr>
-          </a:p>
-          <a:p>
-            <a:r>
-              <a:rPr lang="en-US" dirty="0" smtClean="0">
-                <a:latin typeface="Georgia" panose="02040502050405020303" pitchFamily="18" charset="0"/>
-              </a:rPr>
-              <a:t>What </a:t>
-            </a:r>
             <a:r>
               <a:rPr lang="en-US" dirty="0">
                 <a:latin typeface="Georgia" panose="02040502050405020303" pitchFamily="18" charset="0"/>
               </a:rPr>
-              <a:t>we used it for</a:t>
+              <a:t>*What we used it for</a:t>
             </a:r>
           </a:p>
           <a:p>
             <a:pPr lvl="1"/>
             <a:r>
-              <a:rPr lang="en-US" dirty="0" smtClean="0">
+              <a:rPr lang="en-US" dirty="0">
                 <a:latin typeface="Georgia" panose="02040502050405020303" pitchFamily="18" charset="0"/>
               </a:rPr>
-              <a:t>Write &amp; Edit code</a:t>
-            </a:r>
-            <a:endParaRPr lang="en-US" dirty="0">
-              <a:latin typeface="Georgia" panose="02040502050405020303" pitchFamily="18" charset="0"/>
-            </a:endParaRPr>
-          </a:p>
-          <a:p>
-            <a:pPr lvl="1"/>
-            <a:endParaRPr lang="en-US" dirty="0">
-              <a:latin typeface="Georgia" panose="02040502050405020303" pitchFamily="18" charset="0"/>
-            </a:endParaRPr>
+              <a:t>Create local server</a:t>
+            </a:r>
           </a:p>
         </p:txBody>
       </p:sp>
     </p:spTree>
     <p:extLst>
       <p:ext uri="{BB962C8B-B14F-4D97-AF65-F5344CB8AC3E}">
-        <p14:creationId xmlns:p14="http://schemas.microsoft.com/office/powerpoint/2010/main" val="3241630164"/>
+        <p14:creationId xmlns:p14="http://schemas.microsoft.com/office/powerpoint/2010/main" val="1724907069"/>
       </p:ext>
     </p:extLst>
   </p:cSld>
@@ -9193,6 +9279,168 @@
         <p:spPr>
           <a:xfrm>
             <a:off x="381000" y="230188"/>
+            <a:ext cx="8382000" cy="1163395"/>
+          </a:xfrm>
+        </p:spPr>
+        <p:txBody>
+          <a:bodyPr>
+            <a:normAutofit/>
+          </a:bodyPr>
+          <a:lstStyle/>
+          <a:p>
+            <a:r>
+              <a:rPr lang="en-US" dirty="0">
+                <a:latin typeface="Georgia" panose="02040502050405020303" pitchFamily="18" charset="0"/>
+              </a:rPr>
+              <a:t>Development Tools</a:t>
+            </a:r>
+            <a:br>
+              <a:rPr lang="en-US" dirty="0">
+                <a:latin typeface="Georgia" panose="02040502050405020303" pitchFamily="18" charset="0"/>
+              </a:rPr>
+            </a:br>
+            <a:r>
+              <a:rPr lang="en-US" sz="3600" dirty="0">
+                <a:solidFill>
+                  <a:schemeClr val="tx2"/>
+                </a:solidFill>
+                <a:latin typeface="Georgia" panose="02040502050405020303" pitchFamily="18" charset="0"/>
+              </a:rPr>
+              <a:t>Notepad++</a:t>
+            </a:r>
+            <a:endParaRPr lang="en-US" dirty="0">
+              <a:solidFill>
+                <a:schemeClr val="tx2"/>
+              </a:solidFill>
+              <a:latin typeface="Georgia" panose="02040502050405020303" pitchFamily="18" charset="0"/>
+            </a:endParaRPr>
+          </a:p>
+        </p:txBody>
+      </p:sp>
+      <p:sp>
+        <p:nvSpPr>
+          <p:cNvPr id="3" name="Text Placeholder 2"/>
+          <p:cNvSpPr>
+            <a:spLocks noGrp="1"/>
+          </p:cNvSpPr>
+          <p:nvPr>
+            <p:ph type="body" sz="quarter" idx="10"/>
+          </p:nvPr>
+        </p:nvSpPr>
+        <p:spPr>
+          <a:xfrm>
+            <a:off x="381000" y="1905000"/>
+            <a:ext cx="8382000" cy="4038600"/>
+          </a:xfrm>
+        </p:spPr>
+        <p:txBody>
+          <a:bodyPr>
+            <a:normAutofit/>
+          </a:bodyPr>
+          <a:lstStyle/>
+          <a:p>
+            <a:r>
+              <a:rPr lang="en-US" dirty="0">
+                <a:latin typeface="Georgia" panose="02040502050405020303" pitchFamily="18" charset="0"/>
+              </a:rPr>
+              <a:t>What is Notepad++?</a:t>
+            </a:r>
+          </a:p>
+          <a:p>
+            <a:pPr lvl="1"/>
+            <a:r>
+              <a:rPr lang="en-US" dirty="0">
+                <a:latin typeface="Georgia" panose="02040502050405020303" pitchFamily="18" charset="0"/>
+              </a:rPr>
+              <a:t>A text editor</a:t>
+            </a:r>
+          </a:p>
+          <a:p>
+            <a:pPr lvl="1"/>
+            <a:r>
+              <a:rPr lang="en-US" dirty="0">
+                <a:latin typeface="Georgia" panose="02040502050405020303" pitchFamily="18" charset="0"/>
+              </a:rPr>
+              <a:t>Extensive plugin library</a:t>
+            </a:r>
+          </a:p>
+          <a:p>
+            <a:pPr lvl="1"/>
+            <a:endParaRPr lang="en-US" dirty="0">
+              <a:latin typeface="Georgia" panose="02040502050405020303" pitchFamily="18" charset="0"/>
+            </a:endParaRPr>
+          </a:p>
+          <a:p>
+            <a:r>
+              <a:rPr lang="en-US" dirty="0">
+                <a:latin typeface="Georgia" panose="02040502050405020303" pitchFamily="18" charset="0"/>
+              </a:rPr>
+              <a:t>What we used it for</a:t>
+            </a:r>
+          </a:p>
+          <a:p>
+            <a:pPr lvl="1"/>
+            <a:r>
+              <a:rPr lang="en-US" dirty="0">
+                <a:latin typeface="Georgia" panose="02040502050405020303" pitchFamily="18" charset="0"/>
+              </a:rPr>
+              <a:t>Write &amp; Edit code</a:t>
+            </a:r>
+          </a:p>
+          <a:p>
+            <a:pPr lvl="1"/>
+            <a:endParaRPr lang="en-US" dirty="0">
+              <a:latin typeface="Georgia" panose="02040502050405020303" pitchFamily="18" charset="0"/>
+            </a:endParaRPr>
+          </a:p>
+        </p:txBody>
+      </p:sp>
+    </p:spTree>
+    <p:extLst>
+      <p:ext uri="{BB962C8B-B14F-4D97-AF65-F5344CB8AC3E}">
+        <p14:creationId xmlns:p14="http://schemas.microsoft.com/office/powerpoint/2010/main" val="3241630164"/>
+      </p:ext>
+    </p:extLst>
+  </p:cSld>
+  <p:clrMapOvr>
+    <a:masterClrMapping/>
+  </p:clrMapOvr>
+  <p:transition>
+    <p:fade/>
+  </p:transition>
+</p:sld>
+</file>
+
+<file path=ppt/slides/slide21.xml><?xml version="1.0" encoding="utf-8"?>
+<p:sld xmlns:a="http://schemas.openxmlformats.org/drawingml/2006/main" xmlns:r="http://schemas.openxmlformats.org/officeDocument/2006/relationships" xmlns:p="http://schemas.openxmlformats.org/presentationml/2006/main">
+  <p:cSld>
+    <p:spTree>
+      <p:nvGrpSpPr>
+        <p:cNvPr id="1" name=""/>
+        <p:cNvGrpSpPr/>
+        <p:nvPr/>
+      </p:nvGrpSpPr>
+      <p:grpSpPr>
+        <a:xfrm>
+          <a:off x="0" y="0"/>
+          <a:ext cx="0" cy="0"/>
+          <a:chOff x="0" y="0"/>
+          <a:chExt cx="0" cy="0"/>
+        </a:xfrm>
+      </p:grpSpPr>
+      <p:sp>
+        <p:nvSpPr>
+          <p:cNvPr id="2" name="Title 1"/>
+          <p:cNvSpPr>
+            <a:spLocks noGrp="1"/>
+          </p:cNvSpPr>
+          <p:nvPr>
+            <p:ph type="title"/>
+          </p:nvPr>
+        </p:nvSpPr>
+        <p:spPr>
+          <a:xfrm>
+            <a:off x="381000" y="230188"/>
             <a:ext cx="8382000" cy="1903412"/>
           </a:xfrm>
         </p:spPr>
@@ -9214,12 +9462,6 @@
                 <a:latin typeface="Georgia" panose="02040502050405020303" pitchFamily="18" charset="0"/>
               </a:rPr>
             </a:br>
-            <a:r>
-              <a:rPr lang="en-US" dirty="0">
-                <a:latin typeface="Georgia" panose="02040502050405020303" pitchFamily="18" charset="0"/>
-              </a:rPr>
-              <a:t/>
-            </a:r>
             <a:br>
               <a:rPr lang="en-US" dirty="0">
                 <a:latin typeface="Georgia" panose="02040502050405020303" pitchFamily="18" charset="0"/>
@@ -9269,41 +9511,17 @@
           <a:p>
             <a:pPr lvl="1"/>
             <a:r>
-              <a:rPr lang="en-US" sz="1800" dirty="0" smtClean="0">
-                <a:latin typeface="Georgia" panose="02040502050405020303" pitchFamily="18" charset="0"/>
-              </a:rPr>
-              <a:t>Kung</a:t>
-            </a:r>
-            <a:r>
               <a:rPr lang="en-US" sz="1800" dirty="0">
                 <a:latin typeface="Georgia" panose="02040502050405020303" pitchFamily="18" charset="0"/>
               </a:rPr>
-              <a:t>, David, Object-oriented </a:t>
-            </a:r>
-            <a:r>
-              <a:rPr lang="en-US" sz="1800" dirty="0" smtClean="0">
-                <a:latin typeface="Georgia" panose="02040502050405020303" pitchFamily="18" charset="0"/>
-              </a:rPr>
-              <a:t>Software </a:t>
-            </a:r>
-            <a:r>
-              <a:rPr lang="en-US" sz="1800" dirty="0">
-                <a:latin typeface="Georgia" panose="02040502050405020303" pitchFamily="18" charset="0"/>
-              </a:rPr>
-              <a:t>Engineering: An Agile Unified Methodology. New York, NY: McGraw-Hill, 2013. Print</a:t>
-            </a:r>
-            <a:r>
-              <a:rPr lang="en-US" sz="1800" dirty="0" smtClean="0">
-                <a:latin typeface="Georgia" panose="02040502050405020303" pitchFamily="18" charset="0"/>
-              </a:rPr>
-              <a:t>.</a:t>
+              <a:t>Kung, David, Object-oriented Software Engineering: An Agile Unified Methodology. New York, NY: McGraw-Hill, 2013. Print.</a:t>
             </a:r>
           </a:p>
           <a:p>
             <a:pPr marL="517525" lvl="1" indent="0">
               <a:buNone/>
             </a:pPr>
-            <a:endParaRPr lang="en-US" sz="1800" dirty="0" smtClean="0">
+            <a:endParaRPr lang="en-US" sz="1800" dirty="0">
               <a:latin typeface="Georgia" panose="02040502050405020303" pitchFamily="18" charset="0"/>
             </a:endParaRPr>
           </a:p>
@@ -9325,46 +9543,37 @@
               <a:rPr lang="en-US" sz="1800" dirty="0">
                 <a:latin typeface="Georgia" panose="02040502050405020303" pitchFamily="18" charset="0"/>
               </a:rPr>
-              <a:t>). Retrieved March 01, 2017, from https://</a:t>
-            </a:r>
-            <a:r>
-              <a:rPr lang="en-US" sz="1800" dirty="0" smtClean="0">
-                <a:latin typeface="Georgia" panose="02040502050405020303" pitchFamily="18" charset="0"/>
-              </a:rPr>
-              <a:t>www.apachefriends.org/index.html</a:t>
+              <a:t>). Retrieved March 01, 2017, from https://www.apachefriends.org/index.html</a:t>
             </a:r>
           </a:p>
           <a:p>
             <a:pPr marL="517525" lvl="1" indent="0">
               <a:buNone/>
             </a:pPr>
-            <a:endParaRPr lang="en-US" sz="1800" dirty="0" smtClean="0">
-              <a:latin typeface="Georgia" panose="02040502050405020303" pitchFamily="18" charset="0"/>
-            </a:endParaRPr>
-          </a:p>
-          <a:p>
-            <a:pPr lvl="1"/>
-            <a:r>
-              <a:rPr lang="en-US" sz="1800" dirty="0">
-                <a:latin typeface="Georgia" panose="02040502050405020303" pitchFamily="18" charset="0"/>
-              </a:rPr>
-              <a:t>Visual Paradigm. (</a:t>
-            </a:r>
-            <a:r>
-              <a:rPr lang="en-US" sz="1800" dirty="0" err="1">
-                <a:latin typeface="Georgia" panose="02040502050405020303" pitchFamily="18" charset="0"/>
-              </a:rPr>
-              <a:t>n.d.</a:t>
-            </a:r>
-            <a:r>
-              <a:rPr lang="en-US" sz="1800" dirty="0">
-                <a:latin typeface="Georgia" panose="02040502050405020303" pitchFamily="18" charset="0"/>
-              </a:rPr>
-              <a:t>). Retrieved March 01, 2017, from https://www.visual-paradigm.com/</a:t>
-            </a:r>
             <a:endParaRPr lang="en-US" sz="1800" dirty="0">
               <a:latin typeface="Georgia" panose="02040502050405020303" pitchFamily="18" charset="0"/>
             </a:endParaRPr>
+          </a:p>
+          <a:p>
+            <a:pPr lvl="1"/>
+            <a:r>
+              <a:rPr lang="en-US" sz="1800" dirty="0">
+                <a:latin typeface="Georgia" panose="02040502050405020303" pitchFamily="18" charset="0"/>
+              </a:rPr>
+              <a:t>Visual Paradigm. (</a:t>
+            </a:r>
+            <a:r>
+              <a:rPr lang="en-US" sz="1800" dirty="0" err="1">
+                <a:latin typeface="Georgia" panose="02040502050405020303" pitchFamily="18" charset="0"/>
+              </a:rPr>
+              <a:t>n.d.</a:t>
+            </a:r>
+            <a:r>
+              <a:rPr lang="en-US" sz="1800" dirty="0">
+                <a:latin typeface="Georgia" panose="02040502050405020303" pitchFamily="18" charset="0"/>
+              </a:rPr>
+              <a:t>). Retrieved March 01, 2017, from https://www.visual-paradigm.com/</a:t>
+            </a:r>
           </a:p>
         </p:txBody>
       </p:sp>
@@ -9997,7 +10206,7 @@
           <a:p>
             <a:pPr algn="ctr"/>
             <a:r>
-              <a:rPr lang="en-US" dirty="0" smtClean="0">
+              <a:rPr lang="en-US" dirty="0">
                 <a:solidFill>
                   <a:schemeClr val="tx2"/>
                 </a:solidFill>
@@ -10005,12 +10214,6 @@
               </a:rPr>
               <a:t>Old Homepage</a:t>
             </a:r>
-            <a:endParaRPr lang="en-US" dirty="0">
-              <a:solidFill>
-                <a:schemeClr val="tx2"/>
-              </a:solidFill>
-              <a:latin typeface="Georgia" panose="02040502050405020303" pitchFamily="18" charset="0"/>
-            </a:endParaRPr>
           </a:p>
         </p:txBody>
       </p:sp>
@@ -10135,7 +10338,7 @@
           <a:p>
             <a:pPr algn="ctr"/>
             <a:r>
-              <a:rPr lang="en-US" dirty="0" smtClean="0">
+              <a:rPr lang="en-US" dirty="0">
                 <a:solidFill>
                   <a:schemeClr val="tx2"/>
                 </a:solidFill>
@@ -10143,12 +10346,6 @@
               </a:rPr>
               <a:t>Old Browse Page</a:t>
             </a:r>
-            <a:endParaRPr lang="en-US" dirty="0">
-              <a:solidFill>
-                <a:schemeClr val="tx2"/>
-              </a:solidFill>
-              <a:latin typeface="Georgia" panose="02040502050405020303" pitchFamily="18" charset="0"/>
-            </a:endParaRPr>
           </a:p>
         </p:txBody>
       </p:sp>

</xml_diff>